<commit_message>
added today's lecture notes.
</commit_message>
<xml_diff>
--- a/lectures/2018-08-23 basics of algorithms/2018-08-23 intro slides.pptx
+++ b/lectures/2018-08-23 basics of algorithms/2018-08-23 intro slides.pptx
@@ -3377,16 +3377,15 @@
               <a:buNone/>
             </a:pPr>
             <a:r>
-              <a:rPr lang="en-US">
+              <a:rPr lang="en-US" dirty="0">
                 <a:hlinkClick r:id="rId2"/>
               </a:rPr>
               <a:t>https://www.youtube.com/watch?v=Wf9zPeN2va4</a:t>
             </a:r>
             <a:r>
-              <a:rPr lang="en-US"/>
+              <a:rPr lang="en-US" dirty="0"/>
               <a:t> </a:t>
             </a:r>
-            <a:endParaRPr lang="en-US" dirty="0"/>
           </a:p>
         </p:txBody>
       </p:sp>

</xml_diff>